<commit_message>
Presentation as of 5May
</commit_message>
<xml_diff>
--- a/presentation.pptx
+++ b/presentation.pptx
@@ -10,13 +10,17 @@
     <p:sldId id="302" r:id="rId7"/>
     <p:sldId id="310" r:id="rId8"/>
     <p:sldId id="311" r:id="rId9"/>
-    <p:sldId id="303" r:id="rId10"/>
-    <p:sldId id="304" r:id="rId11"/>
-    <p:sldId id="305" r:id="rId12"/>
-    <p:sldId id="306" r:id="rId13"/>
-    <p:sldId id="307" r:id="rId14"/>
-    <p:sldId id="308" r:id="rId15"/>
-    <p:sldId id="309" r:id="rId16"/>
+    <p:sldId id="307" r:id="rId10"/>
+    <p:sldId id="303" r:id="rId11"/>
+    <p:sldId id="304" r:id="rId12"/>
+    <p:sldId id="305" r:id="rId13"/>
+    <p:sldId id="314" r:id="rId14"/>
+    <p:sldId id="315" r:id="rId15"/>
+    <p:sldId id="316" r:id="rId16"/>
+    <p:sldId id="312" r:id="rId17"/>
+    <p:sldId id="306" r:id="rId18"/>
+    <p:sldId id="308" r:id="rId19"/>
+    <p:sldId id="313" r:id="rId20"/>
   </p:sldIdLst>
   <p:sldSz cx="12192000" cy="6858000"/>
   <p:notesSz cx="6858000" cy="9144000"/>
@@ -314,7 +318,7 @@
           <a:p>
             <a:fld id="{9184DA70-C731-4C70-880D-CCD4705E623C}" type="datetime1">
               <a:rPr lang="en-US" smtClean="0"/>
-              <a:t>5/3/21</a:t>
+              <a:t>5/4/21</a:t>
             </a:fld>
             <a:endParaRPr lang="en-US" dirty="0"/>
           </a:p>
@@ -750,7 +754,7 @@
           <a:p>
             <a:fld id="{62D6E202-B606-4609-B914-27C9371A1F6D}" type="datetime1">
               <a:rPr lang="en-US" smtClean="0"/>
-              <a:t>5/3/21</a:t>
+              <a:t>5/4/21</a:t>
             </a:fld>
             <a:endParaRPr lang="en-US" dirty="0"/>
           </a:p>
@@ -1001,7 +1005,7 @@
           <a:p>
             <a:fld id="{62D6E202-B606-4609-B914-27C9371A1F6D}" type="datetime1">
               <a:rPr lang="en-US" smtClean="0"/>
-              <a:t>5/3/21</a:t>
+              <a:t>5/4/21</a:t>
             </a:fld>
             <a:endParaRPr lang="en-US" dirty="0"/>
           </a:p>
@@ -1310,7 +1314,7 @@
           <a:p>
             <a:fld id="{62D6E202-B606-4609-B914-27C9371A1F6D}" type="datetime1">
               <a:rPr lang="en-US" smtClean="0"/>
-              <a:t>5/3/21</a:t>
+              <a:t>5/4/21</a:t>
             </a:fld>
             <a:endParaRPr lang="en-US" dirty="0"/>
           </a:p>
@@ -1629,7 +1633,7 @@
           <a:p>
             <a:fld id="{62D6E202-B606-4609-B914-27C9371A1F6D}" type="datetime1">
               <a:rPr lang="en-US" smtClean="0"/>
-              <a:t>5/3/21</a:t>
+              <a:t>5/4/21</a:t>
             </a:fld>
             <a:endParaRPr lang="en-US" dirty="0"/>
           </a:p>
@@ -1932,7 +1936,7 @@
           <a:p>
             <a:fld id="{62D6E202-B606-4609-B914-27C9371A1F6D}" type="datetime1">
               <a:rPr lang="en-US" smtClean="0"/>
-              <a:t>5/3/21</a:t>
+              <a:t>5/4/21</a:t>
             </a:fld>
             <a:endParaRPr lang="en-US" dirty="0"/>
           </a:p>
@@ -2300,7 +2304,7 @@
           <a:p>
             <a:fld id="{62D6E202-B606-4609-B914-27C9371A1F6D}" type="datetime1">
               <a:rPr lang="en-US" smtClean="0"/>
-              <a:t>5/3/21</a:t>
+              <a:t>5/4/21</a:t>
             </a:fld>
             <a:endParaRPr lang="en-US" dirty="0"/>
           </a:p>
@@ -2475,7 +2479,7 @@
           <a:p>
             <a:fld id="{62D6E202-B606-4609-B914-27C9371A1F6D}" type="datetime1">
               <a:rPr lang="en-US" smtClean="0"/>
-              <a:t>5/3/21</a:t>
+              <a:t>5/4/21</a:t>
             </a:fld>
             <a:endParaRPr lang="en-US" dirty="0"/>
           </a:p>
@@ -2656,7 +2660,7 @@
           <a:p>
             <a:fld id="{62D6E202-B606-4609-B914-27C9371A1F6D}" type="datetime1">
               <a:rPr lang="en-US" smtClean="0"/>
-              <a:t>5/3/21</a:t>
+              <a:t>5/4/21</a:t>
             </a:fld>
             <a:endParaRPr lang="en-US" dirty="0"/>
           </a:p>
@@ -2827,7 +2831,7 @@
           <a:p>
             <a:fld id="{4BE1D723-8F53-4F53-90B0-1982A396982E}" type="datetime1">
               <a:rPr lang="en-US" smtClean="0"/>
-              <a:t>5/3/21</a:t>
+              <a:t>5/4/21</a:t>
             </a:fld>
             <a:endParaRPr lang="en-US" dirty="0"/>
           </a:p>
@@ -3077,7 +3081,7 @@
           <a:p>
             <a:fld id="{97669AF7-7BEB-44E4-9852-375E34362B5B}" type="datetime1">
               <a:rPr lang="en-US" smtClean="0"/>
-              <a:t>5/3/21</a:t>
+              <a:t>5/4/21</a:t>
             </a:fld>
             <a:endParaRPr lang="en-US" dirty="0"/>
           </a:p>
@@ -3313,7 +3317,7 @@
           <a:p>
             <a:fld id="{BAAAC38D-0552-4C82-B593-E6124DFADBE2}" type="datetime1">
               <a:rPr lang="en-US" smtClean="0"/>
-              <a:t>5/3/21</a:t>
+              <a:t>5/4/21</a:t>
             </a:fld>
             <a:endParaRPr lang="en-US" dirty="0"/>
           </a:p>
@@ -3695,7 +3699,7 @@
           <a:p>
             <a:fld id="{D9DF0F1C-5577-4ACB-BB62-DF8F3C494C7E}" type="datetime1">
               <a:rPr lang="en-US" smtClean="0"/>
-              <a:t>5/3/21</a:t>
+              <a:t>5/4/21</a:t>
             </a:fld>
             <a:endParaRPr lang="en-US" dirty="0"/>
           </a:p>
@@ -3813,7 +3817,7 @@
           <a:p>
             <a:fld id="{1775B394-D9F9-4F0C-B15D-605F45CB9E9F}" type="datetime1">
               <a:rPr lang="en-US" smtClean="0"/>
-              <a:t>5/3/21</a:t>
+              <a:t>5/4/21</a:t>
             </a:fld>
             <a:endParaRPr lang="en-US" dirty="0"/>
           </a:p>
@@ -3908,7 +3912,7 @@
           <a:p>
             <a:fld id="{39667345-2558-425A-8533-9BFDBCE15005}" type="datetime1">
               <a:rPr lang="en-US" smtClean="0"/>
-              <a:t>5/3/21</a:t>
+              <a:t>5/4/21</a:t>
             </a:fld>
             <a:endParaRPr lang="en-US" dirty="0"/>
           </a:p>
@@ -4163,7 +4167,7 @@
           <a:p>
             <a:fld id="{92BEA474-078D-4E9B-9B14-09A87B19DC46}" type="datetime1">
               <a:rPr lang="en-US" smtClean="0"/>
-              <a:t>5/3/21</a:t>
+              <a:t>5/4/21</a:t>
             </a:fld>
             <a:endParaRPr lang="en-US" dirty="0"/>
           </a:p>
@@ -4447,7 +4451,7 @@
           <a:p>
             <a:fld id="{4907D986-8816-4272-A432-0437A28A9828}" type="datetime1">
               <a:rPr lang="en-US" smtClean="0"/>
-              <a:t>5/3/21</a:t>
+              <a:t>5/4/21</a:t>
             </a:fld>
             <a:endParaRPr lang="en-US" dirty="0"/>
           </a:p>
@@ -4854,7 +4858,7 @@
           <a:p>
             <a:fld id="{62D6E202-B606-4609-B914-27C9371A1F6D}" type="datetime1">
               <a:rPr lang="en-US" smtClean="0"/>
-              <a:t>5/3/21</a:t>
+              <a:t>5/4/21</a:t>
             </a:fld>
             <a:endParaRPr lang="en-US" dirty="0"/>
           </a:p>
@@ -5609,7 +5613,7 @@
           <p:cNvPr id="2" name="Title 1">
             <a:extLst>
               <a:ext uri="{FF2B5EF4-FFF2-40B4-BE49-F238E27FC236}">
-                <a16:creationId xmlns:a16="http://schemas.microsoft.com/office/drawing/2014/main" id="{446CBE06-FA0E-401D-96A6-48A5BB928C46}"/>
+                <a16:creationId xmlns:a16="http://schemas.microsoft.com/office/drawing/2014/main" id="{172685EB-9451-4644-BB8C-1887E09914D9}"/>
               </a:ext>
             </a:extLst>
           </p:cNvPr>
@@ -5620,49 +5624,91 @@
             <p:ph type="title"/>
           </p:nvPr>
         </p:nvSpPr>
-        <p:spPr/>
-        <p:txBody>
-          <a:bodyPr>
-            <a:normAutofit fontScale="90000"/>
-          </a:bodyPr>
+        <p:spPr>
+          <a:xfrm>
+            <a:off x="581181" y="4624915"/>
+            <a:ext cx="9734796" cy="1507067"/>
+          </a:xfrm>
+        </p:spPr>
+        <p:txBody>
+          <a:bodyPr/>
           <a:lstStyle/>
           <a:p>
             <a:r>
               <a:rPr lang="en-US" dirty="0"/>
-              <a:t>ANOVA/ ordinary least squares (again, if we can get it working right)</a:t>
-            </a:r>
-          </a:p>
-        </p:txBody>
-      </p:sp>
-      <p:sp>
-        <p:nvSpPr>
-          <p:cNvPr id="3" name="Content Placeholder 2">
+              <a:t>Grocery and pharmacy comparison</a:t>
+            </a:r>
+          </a:p>
+        </p:txBody>
+      </p:sp>
+      <p:pic>
+        <p:nvPicPr>
+          <p:cNvPr id="6" name="Content Placeholder 5">
             <a:extLst>
               <a:ext uri="{FF2B5EF4-FFF2-40B4-BE49-F238E27FC236}">
-                <a16:creationId xmlns:a16="http://schemas.microsoft.com/office/drawing/2014/main" id="{9745DC1A-FACE-453D-B3BB-DD6833060B7D}"/>
+                <a16:creationId xmlns:a16="http://schemas.microsoft.com/office/drawing/2014/main" id="{9229A8E9-1B53-4E4B-A297-87F5C154A13C}"/>
               </a:ext>
             </a:extLst>
           </p:cNvPr>
-          <p:cNvSpPr>
-            <a:spLocks noGrp="1"/>
-          </p:cNvSpPr>
-          <p:nvPr>
-            <p:ph idx="1"/>
-          </p:nvPr>
-        </p:nvSpPr>
-        <p:spPr/>
-        <p:txBody>
-          <a:bodyPr/>
-          <a:lstStyle/>
-          <a:p>
-            <a:endParaRPr lang="en-US"/>
-          </a:p>
-        </p:txBody>
-      </p:sp>
+          <p:cNvPicPr>
+            <a:picLocks noGrp="1" noChangeAspect="1"/>
+          </p:cNvPicPr>
+          <p:nvPr>
+            <p:ph sz="half" idx="1"/>
+          </p:nvPr>
+        </p:nvPicPr>
+        <p:blipFill>
+          <a:blip r:embed="rId2"/>
+          <a:stretch>
+            <a:fillRect/>
+          </a:stretch>
+        </p:blipFill>
+        <p:spPr>
+          <a:xfrm>
+            <a:off x="5835763" y="723902"/>
+            <a:ext cx="4937125" cy="3291416"/>
+          </a:xfrm>
+          <a:solidFill>
+            <a:schemeClr val="tx1"/>
+          </a:solidFill>
+        </p:spPr>
+      </p:pic>
+      <p:pic>
+        <p:nvPicPr>
+          <p:cNvPr id="8" name="Content Placeholder 7">
+            <a:extLst>
+              <a:ext uri="{FF2B5EF4-FFF2-40B4-BE49-F238E27FC236}">
+                <a16:creationId xmlns:a16="http://schemas.microsoft.com/office/drawing/2014/main" id="{A44E0A42-3522-7348-BAC5-17F68F6D6803}"/>
+              </a:ext>
+            </a:extLst>
+          </p:cNvPr>
+          <p:cNvPicPr>
+            <a:picLocks noGrp="1" noChangeAspect="1"/>
+          </p:cNvPicPr>
+          <p:nvPr>
+            <p:ph sz="half" idx="2"/>
+          </p:nvPr>
+        </p:nvPicPr>
+        <p:blipFill>
+          <a:blip r:embed="rId3"/>
+          <a:stretch>
+            <a:fillRect/>
+          </a:stretch>
+        </p:blipFill>
+        <p:spPr>
+          <a:xfrm>
+            <a:off x="684212" y="726018"/>
+            <a:ext cx="4933950" cy="3289300"/>
+          </a:xfrm>
+          <a:solidFill>
+            <a:schemeClr val="tx1"/>
+          </a:solidFill>
+        </p:spPr>
+      </p:pic>
     </p:spTree>
     <p:extLst>
       <p:ext uri="{BB962C8B-B14F-4D97-AF65-F5344CB8AC3E}">
-        <p14:creationId xmlns:p14="http://schemas.microsoft.com/office/powerpoint/2010/main" val="3935500864"/>
+        <p14:creationId xmlns:p14="http://schemas.microsoft.com/office/powerpoint/2010/main" val="1692805677"/>
       </p:ext>
     </p:extLst>
   </p:cSld>
@@ -5694,7 +5740,7 @@
           <p:cNvPr id="2" name="Title 1">
             <a:extLst>
               <a:ext uri="{FF2B5EF4-FFF2-40B4-BE49-F238E27FC236}">
-                <a16:creationId xmlns:a16="http://schemas.microsoft.com/office/drawing/2014/main" id="{5EB616CF-1A75-4758-A1D9-DCAFAF76B967}"/>
+                <a16:creationId xmlns:a16="http://schemas.microsoft.com/office/drawing/2014/main" id="{172685EB-9451-4644-BB8C-1887E09914D9}"/>
               </a:ext>
             </a:extLst>
           </p:cNvPr>
@@ -5705,57 +5751,91 @@
             <p:ph type="title"/>
           </p:nvPr>
         </p:nvSpPr>
-        <p:spPr/>
-        <p:txBody>
-          <a:bodyPr>
-            <a:normAutofit fontScale="90000"/>
-          </a:bodyPr>
+        <p:spPr>
+          <a:xfrm>
+            <a:off x="684211" y="4487332"/>
+            <a:ext cx="9000701" cy="1810437"/>
+          </a:xfrm>
+        </p:spPr>
+        <p:txBody>
+          <a:bodyPr/>
           <a:lstStyle/>
           <a:p>
             <a:r>
               <a:rPr lang="en-US" dirty="0"/>
-              <a:t>Summary of findings, re-visit </a:t>
-            </a:r>
-            <a:r>
-              <a:rPr lang="en-US" dirty="0" err="1"/>
-              <a:t>hypothesies</a:t>
-            </a:r>
-            <a:r>
-              <a:rPr lang="en-US" dirty="0"/>
-              <a:t> and say what happened with them and if they are good and all that kind of stuff</a:t>
-            </a:r>
-          </a:p>
-        </p:txBody>
-      </p:sp>
-      <p:sp>
-        <p:nvSpPr>
-          <p:cNvPr id="3" name="Content Placeholder 2">
+              <a:t>Retail and recreation comparison</a:t>
+            </a:r>
+          </a:p>
+        </p:txBody>
+      </p:sp>
+      <p:pic>
+        <p:nvPicPr>
+          <p:cNvPr id="6" name="Content Placeholder 5">
             <a:extLst>
               <a:ext uri="{FF2B5EF4-FFF2-40B4-BE49-F238E27FC236}">
-                <a16:creationId xmlns:a16="http://schemas.microsoft.com/office/drawing/2014/main" id="{F5013E97-3D30-40D5-B6BD-99C0D2D62DA3}"/>
+                <a16:creationId xmlns:a16="http://schemas.microsoft.com/office/drawing/2014/main" id="{3A9574D8-174E-534D-81D6-56F2285789ED}"/>
               </a:ext>
             </a:extLst>
           </p:cNvPr>
-          <p:cNvSpPr>
-            <a:spLocks noGrp="1"/>
-          </p:cNvSpPr>
-          <p:nvPr>
-            <p:ph idx="1"/>
-          </p:nvPr>
-        </p:nvSpPr>
-        <p:spPr/>
-        <p:txBody>
-          <a:bodyPr/>
-          <a:lstStyle/>
-          <a:p>
-            <a:endParaRPr lang="en-US"/>
-          </a:p>
-        </p:txBody>
-      </p:sp>
+          <p:cNvPicPr>
+            <a:picLocks noGrp="1" noChangeAspect="1"/>
+          </p:cNvPicPr>
+          <p:nvPr>
+            <p:ph sz="half" idx="1"/>
+          </p:nvPr>
+        </p:nvPicPr>
+        <p:blipFill>
+          <a:blip r:embed="rId2"/>
+          <a:stretch>
+            <a:fillRect/>
+          </a:stretch>
+        </p:blipFill>
+        <p:spPr>
+          <a:xfrm>
+            <a:off x="684213" y="847461"/>
+            <a:ext cx="4937125" cy="3291416"/>
+          </a:xfrm>
+          <a:solidFill>
+            <a:schemeClr val="tx1"/>
+          </a:solidFill>
+        </p:spPr>
+      </p:pic>
+      <p:pic>
+        <p:nvPicPr>
+          <p:cNvPr id="8" name="Content Placeholder 7">
+            <a:extLst>
+              <a:ext uri="{FF2B5EF4-FFF2-40B4-BE49-F238E27FC236}">
+                <a16:creationId xmlns:a16="http://schemas.microsoft.com/office/drawing/2014/main" id="{265D2112-5BE1-B24D-8784-4EC5FD79EA63}"/>
+              </a:ext>
+            </a:extLst>
+          </p:cNvPr>
+          <p:cNvPicPr>
+            <a:picLocks noGrp="1" noChangeAspect="1"/>
+          </p:cNvPicPr>
+          <p:nvPr>
+            <p:ph sz="half" idx="2"/>
+          </p:nvPr>
+        </p:nvPicPr>
+        <p:blipFill>
+          <a:blip r:embed="rId3"/>
+          <a:stretch>
+            <a:fillRect/>
+          </a:stretch>
+        </p:blipFill>
+        <p:spPr>
+          <a:xfrm>
+            <a:off x="5808663" y="848519"/>
+            <a:ext cx="4933950" cy="3289300"/>
+          </a:xfrm>
+          <a:solidFill>
+            <a:schemeClr val="tx1"/>
+          </a:solidFill>
+        </p:spPr>
+      </p:pic>
     </p:spTree>
     <p:extLst>
       <p:ext uri="{BB962C8B-B14F-4D97-AF65-F5344CB8AC3E}">
-        <p14:creationId xmlns:p14="http://schemas.microsoft.com/office/powerpoint/2010/main" val="2661428305"/>
+        <p14:creationId xmlns:p14="http://schemas.microsoft.com/office/powerpoint/2010/main" val="701807338"/>
       </p:ext>
     </p:extLst>
   </p:cSld>
@@ -5787,7 +5867,7 @@
           <p:cNvPr id="2" name="Title 1">
             <a:extLst>
               <a:ext uri="{FF2B5EF4-FFF2-40B4-BE49-F238E27FC236}">
-                <a16:creationId xmlns:a16="http://schemas.microsoft.com/office/drawing/2014/main" id="{5E055E48-8955-49AA-9C19-D9BDE0901F3E}"/>
+                <a16:creationId xmlns:a16="http://schemas.microsoft.com/office/drawing/2014/main" id="{172685EB-9451-4644-BB8C-1887E09914D9}"/>
               </a:ext>
             </a:extLst>
           </p:cNvPr>
@@ -5800,34 +5880,350 @@
         </p:nvSpPr>
         <p:spPr/>
         <p:txBody>
+          <a:bodyPr/>
+          <a:lstStyle/>
+          <a:p>
+            <a:r>
+              <a:rPr lang="en-US" dirty="0"/>
+              <a:t>Transit station comparison</a:t>
+            </a:r>
+          </a:p>
+        </p:txBody>
+      </p:sp>
+      <p:pic>
+        <p:nvPicPr>
+          <p:cNvPr id="6" name="Content Placeholder 5">
+            <a:extLst>
+              <a:ext uri="{FF2B5EF4-FFF2-40B4-BE49-F238E27FC236}">
+                <a16:creationId xmlns:a16="http://schemas.microsoft.com/office/drawing/2014/main" id="{07E4C37E-29EC-B642-9C63-DD4208A2388B}"/>
+              </a:ext>
+            </a:extLst>
+          </p:cNvPr>
+          <p:cNvPicPr>
+            <a:picLocks noGrp="1" noChangeAspect="1"/>
+          </p:cNvPicPr>
+          <p:nvPr>
+            <p:ph sz="half" idx="1"/>
+          </p:nvPr>
+        </p:nvPicPr>
+        <p:blipFill>
+          <a:blip r:embed="rId2"/>
+          <a:stretch>
+            <a:fillRect/>
+          </a:stretch>
+        </p:blipFill>
+        <p:spPr>
+          <a:xfrm>
+            <a:off x="684213" y="847461"/>
+            <a:ext cx="4937125" cy="3291416"/>
+          </a:xfrm>
+          <a:solidFill>
+            <a:schemeClr val="tx1"/>
+          </a:solidFill>
+        </p:spPr>
+      </p:pic>
+      <p:pic>
+        <p:nvPicPr>
+          <p:cNvPr id="8" name="Content Placeholder 7">
+            <a:extLst>
+              <a:ext uri="{FF2B5EF4-FFF2-40B4-BE49-F238E27FC236}">
+                <a16:creationId xmlns:a16="http://schemas.microsoft.com/office/drawing/2014/main" id="{E164724F-4DA9-1047-925A-908B92593EB9}"/>
+              </a:ext>
+            </a:extLst>
+          </p:cNvPr>
+          <p:cNvPicPr>
+            <a:picLocks noGrp="1" noChangeAspect="1"/>
+          </p:cNvPicPr>
+          <p:nvPr>
+            <p:ph sz="half" idx="2"/>
+          </p:nvPr>
+        </p:nvPicPr>
+        <p:blipFill>
+          <a:blip r:embed="rId3"/>
+          <a:stretch>
+            <a:fillRect/>
+          </a:stretch>
+        </p:blipFill>
+        <p:spPr>
+          <a:xfrm>
+            <a:off x="5808663" y="848519"/>
+            <a:ext cx="4933950" cy="3289300"/>
+          </a:xfrm>
+          <a:solidFill>
+            <a:schemeClr val="tx1"/>
+          </a:solidFill>
+        </p:spPr>
+      </p:pic>
+    </p:spTree>
+    <p:extLst>
+      <p:ext uri="{BB962C8B-B14F-4D97-AF65-F5344CB8AC3E}">
+        <p14:creationId xmlns:p14="http://schemas.microsoft.com/office/powerpoint/2010/main" val="504997362"/>
+      </p:ext>
+    </p:extLst>
+  </p:cSld>
+  <p:clrMapOvr>
+    <a:masterClrMapping/>
+  </p:clrMapOvr>
+</p:sld>
+</file>
+
+<file path=ppt/slides/slide13.xml><?xml version="1.0" encoding="utf-8"?>
+<p:sld xmlns:a="http://schemas.openxmlformats.org/drawingml/2006/main" xmlns:r="http://schemas.openxmlformats.org/officeDocument/2006/relationships" xmlns:p="http://schemas.openxmlformats.org/presentationml/2006/main">
+  <p:cSld>
+    <p:spTree>
+      <p:nvGrpSpPr>
+        <p:cNvPr id="1" name=""/>
+        <p:cNvGrpSpPr/>
+        <p:nvPr/>
+      </p:nvGrpSpPr>
+      <p:grpSpPr>
+        <a:xfrm>
+          <a:off x="0" y="0"/>
+          <a:ext cx="0" cy="0"/>
+          <a:chOff x="0" y="0"/>
+          <a:chExt cx="0" cy="0"/>
+        </a:xfrm>
+      </p:grpSpPr>
+      <p:sp>
+        <p:nvSpPr>
+          <p:cNvPr id="2" name="Title 1">
+            <a:extLst>
+              <a:ext uri="{FF2B5EF4-FFF2-40B4-BE49-F238E27FC236}">
+                <a16:creationId xmlns:a16="http://schemas.microsoft.com/office/drawing/2014/main" id="{BB4E9A05-DAF2-4E60-90C7-DEC3ABD8C529}"/>
+              </a:ext>
+            </a:extLst>
+          </p:cNvPr>
+          <p:cNvSpPr>
+            <a:spLocks noGrp="1"/>
+          </p:cNvSpPr>
+          <p:nvPr>
+            <p:ph type="title"/>
+          </p:nvPr>
+        </p:nvSpPr>
+        <p:spPr/>
+        <p:txBody>
+          <a:bodyPr/>
+          <a:lstStyle/>
+          <a:p>
+            <a:r>
+              <a:rPr lang="en-US" dirty="0"/>
+              <a:t>Workplace comparison</a:t>
+            </a:r>
+          </a:p>
+        </p:txBody>
+      </p:sp>
+      <p:pic>
+        <p:nvPicPr>
+          <p:cNvPr id="7" name="Content Placeholder 6">
+            <a:extLst>
+              <a:ext uri="{FF2B5EF4-FFF2-40B4-BE49-F238E27FC236}">
+                <a16:creationId xmlns:a16="http://schemas.microsoft.com/office/drawing/2014/main" id="{43B7A296-F041-E546-ACEE-615D3B56F2BB}"/>
+              </a:ext>
+            </a:extLst>
+          </p:cNvPr>
+          <p:cNvPicPr>
+            <a:picLocks noGrp="1" noChangeAspect="1"/>
+          </p:cNvPicPr>
+          <p:nvPr>
+            <p:ph sz="half" idx="1"/>
+          </p:nvPr>
+        </p:nvPicPr>
+        <p:blipFill>
+          <a:blip r:embed="rId2"/>
+          <a:stretch>
+            <a:fillRect/>
+          </a:stretch>
+        </p:blipFill>
+        <p:spPr>
+          <a:xfrm>
+            <a:off x="684213" y="847461"/>
+            <a:ext cx="4937125" cy="3291416"/>
+          </a:xfrm>
+          <a:solidFill>
+            <a:schemeClr val="tx1"/>
+          </a:solidFill>
+        </p:spPr>
+      </p:pic>
+      <p:pic>
+        <p:nvPicPr>
+          <p:cNvPr id="9" name="Content Placeholder 8">
+            <a:extLst>
+              <a:ext uri="{FF2B5EF4-FFF2-40B4-BE49-F238E27FC236}">
+                <a16:creationId xmlns:a16="http://schemas.microsoft.com/office/drawing/2014/main" id="{3D730261-315D-9D4E-B519-93CC7C634AB0}"/>
+              </a:ext>
+            </a:extLst>
+          </p:cNvPr>
+          <p:cNvPicPr>
+            <a:picLocks noGrp="1" noChangeAspect="1"/>
+          </p:cNvPicPr>
+          <p:nvPr>
+            <p:ph sz="half" idx="2"/>
+          </p:nvPr>
+        </p:nvPicPr>
+        <p:blipFill>
+          <a:blip r:embed="rId3"/>
+          <a:stretch>
+            <a:fillRect/>
+          </a:stretch>
+        </p:blipFill>
+        <p:spPr>
+          <a:xfrm>
+            <a:off x="5808663" y="848519"/>
+            <a:ext cx="4933950" cy="3289300"/>
+          </a:xfrm>
+          <a:solidFill>
+            <a:schemeClr val="tx1"/>
+          </a:solidFill>
+        </p:spPr>
+      </p:pic>
+    </p:spTree>
+    <p:extLst>
+      <p:ext uri="{BB962C8B-B14F-4D97-AF65-F5344CB8AC3E}">
+        <p14:creationId xmlns:p14="http://schemas.microsoft.com/office/powerpoint/2010/main" val="21956008"/>
+      </p:ext>
+    </p:extLst>
+  </p:cSld>
+  <p:clrMapOvr>
+    <a:masterClrMapping/>
+  </p:clrMapOvr>
+</p:sld>
+</file>
+
+<file path=ppt/slides/slide14.xml><?xml version="1.0" encoding="utf-8"?>
+<p:sld xmlns:a="http://schemas.openxmlformats.org/drawingml/2006/main" xmlns:r="http://schemas.openxmlformats.org/officeDocument/2006/relationships" xmlns:p="http://schemas.openxmlformats.org/presentationml/2006/main">
+  <p:cSld>
+    <p:spTree>
+      <p:nvGrpSpPr>
+        <p:cNvPr id="1" name=""/>
+        <p:cNvGrpSpPr/>
+        <p:nvPr/>
+      </p:nvGrpSpPr>
+      <p:grpSpPr>
+        <a:xfrm>
+          <a:off x="0" y="0"/>
+          <a:ext cx="0" cy="0"/>
+          <a:chOff x="0" y="0"/>
+          <a:chExt cx="0" cy="0"/>
+        </a:xfrm>
+      </p:grpSpPr>
+      <p:sp>
+        <p:nvSpPr>
+          <p:cNvPr id="2" name="Title 1">
+            <a:extLst>
+              <a:ext uri="{FF2B5EF4-FFF2-40B4-BE49-F238E27FC236}">
+                <a16:creationId xmlns:a16="http://schemas.microsoft.com/office/drawing/2014/main" id="{BCF6BFCD-257A-40B2-ACF5-D9FBD751C7DB}"/>
+              </a:ext>
+            </a:extLst>
+          </p:cNvPr>
+          <p:cNvSpPr>
+            <a:spLocks noGrp="1"/>
+          </p:cNvSpPr>
+          <p:nvPr>
+            <p:ph type="title"/>
+          </p:nvPr>
+        </p:nvSpPr>
+        <p:spPr>
+          <a:xfrm>
+            <a:off x="167426" y="5267459"/>
+            <a:ext cx="11346288" cy="1507067"/>
+          </a:xfrm>
+        </p:spPr>
+        <p:txBody>
+          <a:bodyPr/>
+          <a:lstStyle/>
+          <a:p>
+            <a:r>
+              <a:rPr lang="en-US" dirty="0"/>
+              <a:t>Heatmap of retail visits during pandemic</a:t>
+            </a:r>
+          </a:p>
+        </p:txBody>
+      </p:sp>
+      <p:pic>
+        <p:nvPicPr>
+          <p:cNvPr id="5" name="Content Placeholder 4" descr="A map of the countries/regions&#10;&#10;Description automatically generated with low confidence">
+            <a:extLst>
+              <a:ext uri="{FF2B5EF4-FFF2-40B4-BE49-F238E27FC236}">
+                <a16:creationId xmlns:a16="http://schemas.microsoft.com/office/drawing/2014/main" id="{8DDCD218-05C4-4809-B329-E13845E99FB6}"/>
+              </a:ext>
+            </a:extLst>
+          </p:cNvPr>
+          <p:cNvPicPr>
+            <a:picLocks noGrp="1" noChangeAspect="1"/>
+          </p:cNvPicPr>
+          <p:nvPr>
+            <p:ph idx="1"/>
+          </p:nvPr>
+        </p:nvPicPr>
+        <p:blipFill>
+          <a:blip r:embed="rId2"/>
+          <a:stretch>
+            <a:fillRect/>
+          </a:stretch>
+        </p:blipFill>
+        <p:spPr>
+          <a:xfrm>
+            <a:off x="2042160" y="240045"/>
+            <a:ext cx="8107679" cy="5212080"/>
+          </a:xfrm>
+        </p:spPr>
+      </p:pic>
+    </p:spTree>
+    <p:extLst>
+      <p:ext uri="{BB962C8B-B14F-4D97-AF65-F5344CB8AC3E}">
+        <p14:creationId xmlns:p14="http://schemas.microsoft.com/office/powerpoint/2010/main" val="2087543059"/>
+      </p:ext>
+    </p:extLst>
+  </p:cSld>
+  <p:clrMapOvr>
+    <a:masterClrMapping/>
+  </p:clrMapOvr>
+</p:sld>
+</file>
+
+<file path=ppt/slides/slide15.xml><?xml version="1.0" encoding="utf-8"?>
+<p:sld xmlns:a="http://schemas.openxmlformats.org/drawingml/2006/main" xmlns:r="http://schemas.openxmlformats.org/officeDocument/2006/relationships" xmlns:p="http://schemas.openxmlformats.org/presentationml/2006/main">
+  <p:cSld>
+    <p:spTree>
+      <p:nvGrpSpPr>
+        <p:cNvPr id="1" name=""/>
+        <p:cNvGrpSpPr/>
+        <p:nvPr/>
+      </p:nvGrpSpPr>
+      <p:grpSpPr>
+        <a:xfrm>
+          <a:off x="0" y="0"/>
+          <a:ext cx="0" cy="0"/>
+          <a:chOff x="0" y="0"/>
+          <a:chExt cx="0" cy="0"/>
+        </a:xfrm>
+      </p:grpSpPr>
+      <p:sp>
+        <p:nvSpPr>
+          <p:cNvPr id="2" name="Title 1">
+            <a:extLst>
+              <a:ext uri="{FF2B5EF4-FFF2-40B4-BE49-F238E27FC236}">
+                <a16:creationId xmlns:a16="http://schemas.microsoft.com/office/drawing/2014/main" id="{5EB616CF-1A75-4758-A1D9-DCAFAF76B967}"/>
+              </a:ext>
+            </a:extLst>
+          </p:cNvPr>
+          <p:cNvSpPr>
+            <a:spLocks noGrp="1"/>
+          </p:cNvSpPr>
+          <p:nvPr>
+            <p:ph type="title"/>
+          </p:nvPr>
+        </p:nvSpPr>
+        <p:spPr/>
+        <p:txBody>
           <a:bodyPr>
-            <a:normAutofit fontScale="90000"/>
+            <a:normAutofit/>
           </a:bodyPr>
           <a:lstStyle/>
           <a:p>
             <a:r>
               <a:rPr lang="en-US" dirty="0"/>
-              <a:t>QUESTIONS????? (or maybe some other </a:t>
-            </a:r>
-            <a:r>
-              <a:rPr lang="en-US" dirty="0" err="1"/>
-              <a:t>kinda</a:t>
-            </a:r>
-            <a:r>
-              <a:rPr lang="en-US" dirty="0"/>
-              <a:t> thing I </a:t>
-            </a:r>
-            <a:r>
-              <a:rPr lang="en-US" dirty="0" err="1"/>
-              <a:t>dunno</a:t>
-            </a:r>
-            <a:r>
-              <a:rPr lang="en-US" dirty="0"/>
-              <a:t> I feel like the last slide </a:t>
-            </a:r>
-            <a:r>
-              <a:rPr lang="en-US"/>
-              <a:t>is always questions)</a:t>
+              <a:t>summary</a:t>
             </a:r>
           </a:p>
         </p:txBody>
@@ -5837,7 +6233,7 @@
           <p:cNvPr id="3" name="Content Placeholder 2">
             <a:extLst>
               <a:ext uri="{FF2B5EF4-FFF2-40B4-BE49-F238E27FC236}">
-                <a16:creationId xmlns:a16="http://schemas.microsoft.com/office/drawing/2014/main" id="{F8F6BD0A-B7BA-40B2-A839-5FC615478F7E}"/>
+                <a16:creationId xmlns:a16="http://schemas.microsoft.com/office/drawing/2014/main" id="{F5013E97-3D30-40D5-B6BD-99C0D2D62DA3}"/>
               </a:ext>
             </a:extLst>
           </p:cNvPr>
@@ -5860,7 +6256,65 @@
     </p:spTree>
     <p:extLst>
       <p:ext uri="{BB962C8B-B14F-4D97-AF65-F5344CB8AC3E}">
-        <p14:creationId xmlns:p14="http://schemas.microsoft.com/office/powerpoint/2010/main" val="2810938858"/>
+        <p14:creationId xmlns:p14="http://schemas.microsoft.com/office/powerpoint/2010/main" val="2661428305"/>
+      </p:ext>
+    </p:extLst>
+  </p:cSld>
+  <p:clrMapOvr>
+    <a:masterClrMapping/>
+  </p:clrMapOvr>
+</p:sld>
+</file>
+
+<file path=ppt/slides/slide16.xml><?xml version="1.0" encoding="utf-8"?>
+<p:sld xmlns:a="http://schemas.openxmlformats.org/drawingml/2006/main" xmlns:r="http://schemas.openxmlformats.org/officeDocument/2006/relationships" xmlns:p="http://schemas.openxmlformats.org/presentationml/2006/main">
+  <p:cSld>
+    <p:spTree>
+      <p:nvGrpSpPr>
+        <p:cNvPr id="1" name=""/>
+        <p:cNvGrpSpPr/>
+        <p:nvPr/>
+      </p:nvGrpSpPr>
+      <p:grpSpPr>
+        <a:xfrm>
+          <a:off x="0" y="0"/>
+          <a:ext cx="0" cy="0"/>
+          <a:chOff x="0" y="0"/>
+          <a:chExt cx="0" cy="0"/>
+        </a:xfrm>
+      </p:grpSpPr>
+      <p:sp>
+        <p:nvSpPr>
+          <p:cNvPr id="2" name="Title 1">
+            <a:extLst>
+              <a:ext uri="{FF2B5EF4-FFF2-40B4-BE49-F238E27FC236}">
+                <a16:creationId xmlns:a16="http://schemas.microsoft.com/office/drawing/2014/main" id="{EAFC60FF-2626-9342-81CC-398155965C32}"/>
+              </a:ext>
+            </a:extLst>
+          </p:cNvPr>
+          <p:cNvSpPr>
+            <a:spLocks noGrp="1"/>
+          </p:cNvSpPr>
+          <p:nvPr>
+            <p:ph type="title"/>
+          </p:nvPr>
+        </p:nvSpPr>
+        <p:spPr/>
+        <p:txBody>
+          <a:bodyPr/>
+          <a:lstStyle/>
+          <a:p>
+            <a:r>
+              <a:rPr lang="en-US" dirty="0"/>
+              <a:t>Any Questions?</a:t>
+            </a:r>
+          </a:p>
+        </p:txBody>
+      </p:sp>
+    </p:spTree>
+    <p:extLst>
+      <p:ext uri="{BB962C8B-B14F-4D97-AF65-F5344CB8AC3E}">
+        <p14:creationId xmlns:p14="http://schemas.microsoft.com/office/powerpoint/2010/main" val="1485530803"/>
       </p:ext>
     </p:extLst>
   </p:cSld>
@@ -5981,12 +6435,28 @@
           <a:lstStyle/>
           <a:p>
             <a:r>
-              <a:rPr lang="en-US">
+              <a:rPr lang="en-US" dirty="0">
                 <a:solidFill>
                   <a:srgbClr val="FFFFFF"/>
                 </a:solidFill>
               </a:rPr>
-              <a:t>Source: support.google.com/covid10-mobility</a:t>
+              <a:t>Source: </a:t>
+            </a:r>
+            <a:r>
+              <a:rPr lang="en-US" dirty="0" err="1">
+                <a:solidFill>
+                  <a:srgbClr val="FFFFFF"/>
+                </a:solidFill>
+              </a:rPr>
+              <a:t>www.google.com</a:t>
+            </a:r>
+            <a:r>
+              <a:rPr lang="en-US" dirty="0">
+                <a:solidFill>
+                  <a:srgbClr val="FFFFFF"/>
+                </a:solidFill>
+              </a:rPr>
+              <a:t>/covid19/mobility/</a:t>
             </a:r>
           </a:p>
         </p:txBody>
@@ -6777,8 +7247,45 @@
                   <a:schemeClr val="tx1"/>
                 </a:solidFill>
               </a:rPr>
-              <a:t>The data used only goes back to the beginning of the pandemic, roughly March 2020. The baseline used is five weeks from the beginning of the year 2020.</a:t>
-            </a:r>
+              <a:t>The data used only goes back to the beginning of the pandemic, roughly March 2020. </a:t>
+            </a:r>
+          </a:p>
+          <a:p>
+            <a:r>
+              <a:rPr lang="en-US" dirty="0">
+                <a:solidFill>
+                  <a:schemeClr val="tx1"/>
+                </a:solidFill>
+              </a:rPr>
+              <a:t>The baseline used is five weeks from the beginning of the year 2020. There is no way to determine if the baseline is a representative week. </a:t>
+            </a:r>
+          </a:p>
+          <a:p>
+            <a:r>
+              <a:rPr lang="en-US" dirty="0">
+                <a:solidFill>
+                  <a:schemeClr val="tx1"/>
+                </a:solidFill>
+              </a:rPr>
+              <a:t>We do not have enough movement data from before the pandemic to establish a good baseline. </a:t>
+            </a:r>
+          </a:p>
+          <a:p>
+            <a:r>
+              <a:rPr lang="en-US" dirty="0">
+                <a:solidFill>
+                  <a:schemeClr val="tx1"/>
+                </a:solidFill>
+              </a:rPr>
+              <a:t>Parks also are a place that fluctuates based on the time of year. Visitation will be higher during the warmer months. </a:t>
+            </a:r>
+          </a:p>
+          <a:p>
+            <a:endParaRPr lang="en-US" dirty="0">
+              <a:solidFill>
+                <a:schemeClr val="tx1"/>
+              </a:solidFill>
+            </a:endParaRPr>
           </a:p>
           <a:p>
             <a:endParaRPr lang="en-US" dirty="0">
@@ -6916,6 +7423,24 @@
             </a:r>
           </a:p>
           <a:p>
+            <a:r>
+              <a:rPr lang="en-US" dirty="0" err="1">
+                <a:solidFill>
+                  <a:schemeClr val="tx1"/>
+                </a:solidFill>
+              </a:rPr>
+              <a:t>Plotly</a:t>
+            </a:r>
+            <a:r>
+              <a:rPr lang="en-US" dirty="0">
+                <a:solidFill>
+                  <a:schemeClr val="tx1"/>
+                </a:solidFill>
+              </a:rPr>
+              <a:t> was used for the heatmap. </a:t>
+            </a:r>
+          </a:p>
+          <a:p>
             <a:endParaRPr lang="en-US" dirty="0">
               <a:solidFill>
                 <a:schemeClr val="tx1"/>
@@ -6959,7 +7484,7 @@
           <p:cNvPr id="2" name="Title 1">
             <a:extLst>
               <a:ext uri="{FF2B5EF4-FFF2-40B4-BE49-F238E27FC236}">
-                <a16:creationId xmlns:a16="http://schemas.microsoft.com/office/drawing/2014/main" id="{CB2C0901-96C1-4CEF-B9C7-7A21131A3A5E}"/>
+                <a16:creationId xmlns:a16="http://schemas.microsoft.com/office/drawing/2014/main" id="{446CBE06-FA0E-401D-96A6-48A5BB928C46}"/>
               </a:ext>
             </a:extLst>
           </p:cNvPr>
@@ -6970,51 +7495,268 @@
             <p:ph type="title"/>
           </p:nvPr>
         </p:nvSpPr>
-        <p:spPr/>
-        <p:txBody>
-          <a:bodyPr/>
+        <p:spPr>
+          <a:xfrm>
+            <a:off x="851992" y="309615"/>
+            <a:ext cx="8534400" cy="1507067"/>
+          </a:xfrm>
+        </p:spPr>
+        <p:txBody>
+          <a:bodyPr>
+            <a:normAutofit/>
+          </a:bodyPr>
           <a:lstStyle/>
           <a:p>
             <a:r>
               <a:rPr lang="en-US" dirty="0"/>
-              <a:t>Graph of all the data nationwide</a:t>
-            </a:r>
-          </a:p>
-        </p:txBody>
-      </p:sp>
-      <p:pic>
-        <p:nvPicPr>
-          <p:cNvPr id="5" name="Content Placeholder 4">
+              <a:t>ANOVA</a:t>
+            </a:r>
+          </a:p>
+        </p:txBody>
+      </p:sp>
+      <p:sp>
+        <p:nvSpPr>
+          <p:cNvPr id="4" name="TextBox 3">
             <a:extLst>
               <a:ext uri="{FF2B5EF4-FFF2-40B4-BE49-F238E27FC236}">
-                <a16:creationId xmlns:a16="http://schemas.microsoft.com/office/drawing/2014/main" id="{7DE26B88-B396-E344-B7CC-B90D4137F7FD}"/>
+                <a16:creationId xmlns:a16="http://schemas.microsoft.com/office/drawing/2014/main" id="{A1E9553E-53CF-49DB-B19B-B7E91B0BE908}"/>
               </a:ext>
             </a:extLst>
           </p:cNvPr>
-          <p:cNvPicPr>
-            <a:picLocks noGrp="1" noChangeAspect="1"/>
-          </p:cNvPicPr>
-          <p:nvPr>
-            <p:ph idx="1"/>
-          </p:nvPr>
-        </p:nvPicPr>
-        <p:blipFill>
-          <a:blip r:embed="rId2"/>
-          <a:stretch>
-            <a:fillRect/>
-          </a:stretch>
-        </p:blipFill>
+          <p:cNvSpPr txBox="1"/>
+          <p:nvPr/>
+        </p:nvSpPr>
         <p:spPr>
           <a:xfrm>
-            <a:off x="1738313" y="685800"/>
-            <a:ext cx="6426200" cy="3614738"/>
+            <a:off x="1644242" y="2306972"/>
+            <a:ext cx="9244668" cy="923330"/>
           </a:xfrm>
+          <a:prstGeom prst="rect">
+            <a:avLst/>
+          </a:prstGeom>
+          <a:noFill/>
         </p:spPr>
-      </p:pic>
+        <p:txBody>
+          <a:bodyPr wrap="square" rtlCol="0">
+            <a:spAutoFit/>
+          </a:bodyPr>
+          <a:lstStyle/>
+          <a:p>
+            <a:r>
+              <a:rPr lang="en-US" dirty="0"/>
+              <a:t>With a p-value so small that it is not within the precision scope of a floating point number, we feel confident in rejecting the null hypothesis, and saying that the relationship between cases and people’s movement is statistically significant. </a:t>
+            </a:r>
+          </a:p>
+        </p:txBody>
+      </p:sp>
+      <p:sp>
+        <p:nvSpPr>
+          <p:cNvPr id="5" name="TextBox 4">
+            <a:extLst>
+              <a:ext uri="{FF2B5EF4-FFF2-40B4-BE49-F238E27FC236}">
+                <a16:creationId xmlns:a16="http://schemas.microsoft.com/office/drawing/2014/main" id="{9316CE6F-8E8B-4898-AA23-8E1BD967A709}"/>
+              </a:ext>
+            </a:extLst>
+          </p:cNvPr>
+          <p:cNvSpPr txBox="1"/>
+          <p:nvPr/>
+        </p:nvSpPr>
+        <p:spPr>
+          <a:xfrm>
+            <a:off x="1778466" y="4035105"/>
+            <a:ext cx="6568580" cy="1200329"/>
+          </a:xfrm>
+          <a:prstGeom prst="rect">
+            <a:avLst/>
+          </a:prstGeom>
+          <a:noFill/>
+        </p:spPr>
+        <p:txBody>
+          <a:bodyPr wrap="square" rtlCol="0">
+            <a:spAutoFit/>
+          </a:bodyPr>
+          <a:lstStyle/>
+          <a:p>
+            <a:r>
+              <a:rPr lang="en-US" dirty="0"/>
+              <a:t>ANOVA Numbers:</a:t>
+            </a:r>
+            <a:br>
+              <a:rPr lang="en-US" dirty="0"/>
+            </a:br>
+            <a:r>
+              <a:rPr lang="en-US" dirty="0"/>
+              <a:t>F- statistic: </a:t>
+            </a:r>
+            <a:r>
+              <a:rPr kumimoji="0" lang="en-US" altLang="en-US" sz="1800" b="0" i="0" u="none" strike="noStrike" cap="none" normalizeH="0" baseline="0" dirty="0">
+                <a:ln>
+                  <a:noFill/>
+                </a:ln>
+                <a:effectLst/>
+                <a:latin typeface="var(--vscode-editor-font-family)"/>
+              </a:rPr>
+              <a:t>462.39777712696065</a:t>
+            </a:r>
+          </a:p>
+          <a:p>
+            <a:r>
+              <a:rPr lang="en-US" dirty="0">
+                <a:latin typeface="var(--vscode-editor-font-family)"/>
+              </a:rPr>
+              <a:t>P-Value: 0.0</a:t>
+            </a:r>
+            <a:br>
+              <a:rPr lang="en-US" dirty="0"/>
+            </a:br>
+            <a:endParaRPr lang="en-US" dirty="0"/>
+          </a:p>
+        </p:txBody>
+      </p:sp>
+      <p:sp>
+        <p:nvSpPr>
+          <p:cNvPr id="6" name="Rectangle 1">
+            <a:extLst>
+              <a:ext uri="{FF2B5EF4-FFF2-40B4-BE49-F238E27FC236}">
+                <a16:creationId xmlns:a16="http://schemas.microsoft.com/office/drawing/2014/main" id="{DEC74051-D7DD-4348-8044-9D6D8DE9DB71}"/>
+              </a:ext>
+            </a:extLst>
+          </p:cNvPr>
+          <p:cNvSpPr>
+            <a:spLocks noChangeArrowheads="1"/>
+          </p:cNvSpPr>
+          <p:nvPr/>
+        </p:nvSpPr>
+        <p:spPr bwMode="auto">
+          <a:xfrm>
+            <a:off x="0" y="0"/>
+            <a:ext cx="12192000" cy="457200"/>
+          </a:xfrm>
+          <a:prstGeom prst="rect">
+            <a:avLst/>
+          </a:prstGeom>
+          <a:solidFill>
+            <a:srgbClr val="1E1E1E"/>
+          </a:solidFill>
+          <a:ln>
+            <a:noFill/>
+          </a:ln>
+          <a:effectLst/>
+          <a:extLst>
+            <a:ext uri="{91240B29-F687-4F45-9708-019B960494DF}">
+              <a14:hiddenLine xmlns:a14="http://schemas.microsoft.com/office/drawing/2010/main" w="9525">
+                <a:solidFill>
+                  <a:schemeClr val="tx1"/>
+                </a:solidFill>
+                <a:miter lim="800000"/>
+                <a:headEnd/>
+                <a:tailEnd/>
+              </a14:hiddenLine>
+            </a:ext>
+            <a:ext uri="{AF507438-7753-43E0-B8FC-AC1667EBCBE1}">
+              <a14:hiddenEffects xmlns:a14="http://schemas.microsoft.com/office/drawing/2010/main">
+                <a:effectLst>
+                  <a:outerShdw dist="35921" dir="2700000" algn="ctr" rotWithShape="0">
+                    <a:schemeClr val="bg2"/>
+                  </a:outerShdw>
+                </a:effectLst>
+              </a14:hiddenEffects>
+            </a:ext>
+          </a:extLst>
+        </p:spPr>
+        <p:txBody>
+          <a:bodyPr vert="horz" wrap="none" lIns="91440" tIns="45720" rIns="91440" bIns="45720" numCol="1" anchor="ctr" anchorCtr="0" compatLnSpc="1">
+            <a:prstTxWarp prst="textNoShape">
+              <a:avLst/>
+            </a:prstTxWarp>
+            <a:spAutoFit/>
+          </a:bodyPr>
+          <a:lstStyle/>
+          <a:p>
+            <a:pPr marL="0" marR="0" lvl="0" indent="0" algn="l" defTabSz="914400" rtl="0" eaLnBrk="0" fontAlgn="base" latinLnBrk="0" hangingPunct="0">
+              <a:lnSpc>
+                <a:spcPct val="100000"/>
+              </a:lnSpc>
+              <a:spcBef>
+                <a:spcPct val="0"/>
+              </a:spcBef>
+              <a:spcAft>
+                <a:spcPct val="0"/>
+              </a:spcAft>
+              <a:buClrTx/>
+              <a:buSzTx/>
+              <a:buFontTx/>
+              <a:buNone/>
+              <a:tabLst/>
+            </a:pPr>
+            <a:r>
+              <a:rPr kumimoji="0" lang="en-US" altLang="en-US" sz="1000" b="0" i="0" u="none" strike="noStrike" cap="none" normalizeH="0" baseline="0" dirty="0">
+                <a:ln>
+                  <a:noFill/>
+                </a:ln>
+                <a:solidFill>
+                  <a:srgbClr val="D4D4D4"/>
+                </a:solidFill>
+                <a:effectLst/>
+                <a:latin typeface="var(--vscode-editor-font-family)"/>
+              </a:rPr>
+              <a:t>statistic=462.39777712696065, </a:t>
+            </a:r>
+            <a:r>
+              <a:rPr kumimoji="0" lang="en-US" altLang="en-US" sz="1000" b="0" i="0" u="none" strike="noStrike" cap="none" normalizeH="0" baseline="0" dirty="0" err="1">
+                <a:ln>
+                  <a:noFill/>
+                </a:ln>
+                <a:solidFill>
+                  <a:srgbClr val="D4D4D4"/>
+                </a:solidFill>
+                <a:effectLst/>
+                <a:latin typeface="var(--vscode-editor-font-family)"/>
+              </a:rPr>
+              <a:t>pvalue</a:t>
+            </a:r>
+            <a:r>
+              <a:rPr kumimoji="0" lang="en-US" altLang="en-US" sz="1000" b="0" i="0" u="none" strike="noStrike" cap="none" normalizeH="0" baseline="0" dirty="0">
+                <a:ln>
+                  <a:noFill/>
+                </a:ln>
+                <a:solidFill>
+                  <a:srgbClr val="D4D4D4"/>
+                </a:solidFill>
+                <a:effectLst/>
+                <a:latin typeface="var(--vscode-editor-font-family)"/>
+              </a:rPr>
+              <a:t>=0.0)</a:t>
+            </a:r>
+            <a:r>
+              <a:rPr kumimoji="0" lang="en-US" altLang="en-US" sz="800" b="0" i="0" u="none" strike="noStrike" cap="none" normalizeH="0" baseline="0" dirty="0">
+                <a:ln>
+                  <a:noFill/>
+                </a:ln>
+                <a:solidFill>
+                  <a:schemeClr val="tx1"/>
+                </a:solidFill>
+                <a:effectLst/>
+              </a:rPr>
+              <a:t> </a:t>
+            </a:r>
+            <a:endParaRPr kumimoji="0" lang="en-US" altLang="en-US" sz="1800" b="0" i="0" u="none" strike="noStrike" cap="none" normalizeH="0" baseline="0" dirty="0">
+              <a:ln>
+                <a:noFill/>
+              </a:ln>
+              <a:solidFill>
+                <a:schemeClr val="tx1"/>
+              </a:solidFill>
+              <a:effectLst/>
+              <a:latin typeface="Arial" panose="020B0604020202020204" pitchFamily="34" charset="0"/>
+            </a:endParaRPr>
+          </a:p>
+        </p:txBody>
+      </p:sp>
     </p:spTree>
     <p:extLst>
       <p:ext uri="{BB962C8B-B14F-4D97-AF65-F5344CB8AC3E}">
-        <p14:creationId xmlns:p14="http://schemas.microsoft.com/office/powerpoint/2010/main" val="2856798474"/>
+        <p14:creationId xmlns:p14="http://schemas.microsoft.com/office/powerpoint/2010/main" val="3935500864"/>
       </p:ext>
     </p:extLst>
   </p:cSld>
@@ -7046,7 +7788,7 @@
           <p:cNvPr id="2" name="Title 1">
             <a:extLst>
               <a:ext uri="{FF2B5EF4-FFF2-40B4-BE49-F238E27FC236}">
-                <a16:creationId xmlns:a16="http://schemas.microsoft.com/office/drawing/2014/main" id="{152E58B8-0290-4A78-821D-05F5CABB8AC7}"/>
+                <a16:creationId xmlns:a16="http://schemas.microsoft.com/office/drawing/2014/main" id="{CB2C0901-96C1-4CEF-B9C7-7A21131A3A5E}"/>
               </a:ext>
             </a:extLst>
           </p:cNvPr>
@@ -7057,47 +7799,55 @@
             <p:ph type="title"/>
           </p:nvPr>
         </p:nvSpPr>
-        <p:spPr/>
+        <p:spPr>
+          <a:xfrm>
+            <a:off x="430928" y="5015366"/>
+            <a:ext cx="8828982" cy="1507067"/>
+          </a:xfrm>
+        </p:spPr>
         <p:txBody>
           <a:bodyPr/>
           <a:lstStyle/>
           <a:p>
             <a:r>
               <a:rPr lang="en-US" dirty="0"/>
-              <a:t>Graphs of interesting states</a:t>
-            </a:r>
-          </a:p>
-        </p:txBody>
-      </p:sp>
-      <p:sp>
-        <p:nvSpPr>
-          <p:cNvPr id="3" name="Content Placeholder 2">
+              <a:t>National mobility during covid-19</a:t>
+            </a:r>
+          </a:p>
+        </p:txBody>
+      </p:sp>
+      <p:pic>
+        <p:nvPicPr>
+          <p:cNvPr id="5" name="Content Placeholder 4">
             <a:extLst>
               <a:ext uri="{FF2B5EF4-FFF2-40B4-BE49-F238E27FC236}">
-                <a16:creationId xmlns:a16="http://schemas.microsoft.com/office/drawing/2014/main" id="{876D9C93-09A4-4901-A598-30E55F67A4EC}"/>
+                <a16:creationId xmlns:a16="http://schemas.microsoft.com/office/drawing/2014/main" id="{7DE26B88-B396-E344-B7CC-B90D4137F7FD}"/>
               </a:ext>
             </a:extLst>
           </p:cNvPr>
-          <p:cNvSpPr>
-            <a:spLocks noGrp="1"/>
-          </p:cNvSpPr>
+          <p:cNvPicPr>
+            <a:picLocks noGrp="1" noChangeAspect="1"/>
+          </p:cNvPicPr>
           <p:nvPr>
             <p:ph idx="1"/>
           </p:nvPr>
-        </p:nvSpPr>
-        <p:spPr/>
-        <p:txBody>
-          <a:bodyPr/>
-          <a:lstStyle/>
-          <a:p>
-            <a:endParaRPr lang="en-US"/>
-          </a:p>
-        </p:txBody>
-      </p:sp>
+        </p:nvPicPr>
+        <p:blipFill rotWithShape="1">
+          <a:blip r:embed="rId2"/>
+          <a:srcRect l="7548" t="6406" r="8272" b="6677"/>
+          <a:stretch/>
+        </p:blipFill>
+        <p:spPr>
+          <a:xfrm>
+            <a:off x="1608877" y="219656"/>
+            <a:ext cx="8974245" cy="5212080"/>
+          </a:xfrm>
+        </p:spPr>
+      </p:pic>
     </p:spTree>
     <p:extLst>
       <p:ext uri="{BB962C8B-B14F-4D97-AF65-F5344CB8AC3E}">
-        <p14:creationId xmlns:p14="http://schemas.microsoft.com/office/powerpoint/2010/main" val="1394950397"/>
+        <p14:creationId xmlns:p14="http://schemas.microsoft.com/office/powerpoint/2010/main" val="2856798474"/>
       </p:ext>
     </p:extLst>
   </p:cSld>
@@ -7129,7 +7879,7 @@
           <p:cNvPr id="2" name="Title 1">
             <a:extLst>
               <a:ext uri="{FF2B5EF4-FFF2-40B4-BE49-F238E27FC236}">
-                <a16:creationId xmlns:a16="http://schemas.microsoft.com/office/drawing/2014/main" id="{DD7F1410-A8AF-4F3C-87A4-EDFC2EB7FC68}"/>
+                <a16:creationId xmlns:a16="http://schemas.microsoft.com/office/drawing/2014/main" id="{152E58B8-0290-4A78-821D-05F5CABB8AC7}"/>
               </a:ext>
             </a:extLst>
           </p:cNvPr>
@@ -7140,47 +7890,58 @@
             <p:ph type="title"/>
           </p:nvPr>
         </p:nvSpPr>
-        <p:spPr/>
-        <p:txBody>
-          <a:bodyPr/>
+        <p:spPr>
+          <a:xfrm>
+            <a:off x="103031" y="4841501"/>
+            <a:ext cx="9903853" cy="2016499"/>
+          </a:xfrm>
+        </p:spPr>
+        <p:txBody>
+          <a:bodyPr>
+            <a:normAutofit/>
+          </a:bodyPr>
           <a:lstStyle/>
           <a:p>
             <a:r>
               <a:rPr lang="en-US" dirty="0"/>
-              <a:t>YoY graphs</a:t>
-            </a:r>
-          </a:p>
-        </p:txBody>
-      </p:sp>
-      <p:sp>
-        <p:nvSpPr>
-          <p:cNvPr id="3" name="Content Placeholder 2">
+              <a:t>State Grocery and pharmacy mobility</a:t>
+            </a:r>
+          </a:p>
+        </p:txBody>
+      </p:sp>
+      <p:pic>
+        <p:nvPicPr>
+          <p:cNvPr id="5" name="Content Placeholder 4" descr="Chart&#10;&#10;Description automatically generated">
             <a:extLst>
               <a:ext uri="{FF2B5EF4-FFF2-40B4-BE49-F238E27FC236}">
-                <a16:creationId xmlns:a16="http://schemas.microsoft.com/office/drawing/2014/main" id="{2F02A98F-67DC-4EFB-B0A2-C8E49CD8FBFF}"/>
+                <a16:creationId xmlns:a16="http://schemas.microsoft.com/office/drawing/2014/main" id="{38DFF0C0-C32B-43F1-ACB9-FAC853A4E340}"/>
               </a:ext>
             </a:extLst>
           </p:cNvPr>
-          <p:cNvSpPr>
-            <a:spLocks noGrp="1"/>
-          </p:cNvSpPr>
+          <p:cNvPicPr>
+            <a:picLocks noGrp="1" noChangeAspect="1"/>
+          </p:cNvPicPr>
           <p:nvPr>
             <p:ph idx="1"/>
           </p:nvPr>
-        </p:nvSpPr>
-        <p:spPr/>
-        <p:txBody>
-          <a:bodyPr/>
-          <a:lstStyle/>
-          <a:p>
-            <a:endParaRPr lang="en-US"/>
-          </a:p>
-        </p:txBody>
-      </p:sp>
+        </p:nvPicPr>
+        <p:blipFill>
+          <a:blip r:embed="rId2"/>
+          <a:stretch>
+            <a:fillRect/>
+          </a:stretch>
+        </p:blipFill>
+        <p:spPr>
+          <a:xfrm>
+            <a:off x="820238" y="239079"/>
+            <a:ext cx="10690568" cy="5212080"/>
+          </a:xfrm>
+        </p:spPr>
+      </p:pic>
     </p:spTree>
     <p:extLst>
       <p:ext uri="{BB962C8B-B14F-4D97-AF65-F5344CB8AC3E}">
-        <p14:creationId xmlns:p14="http://schemas.microsoft.com/office/powerpoint/2010/main" val="3078164528"/>
+        <p14:creationId xmlns:p14="http://schemas.microsoft.com/office/powerpoint/2010/main" val="1394950397"/>
       </p:ext>
     </p:extLst>
   </p:cSld>
@@ -7212,7 +7973,7 @@
           <p:cNvPr id="2" name="Title 1">
             <a:extLst>
               <a:ext uri="{FF2B5EF4-FFF2-40B4-BE49-F238E27FC236}">
-                <a16:creationId xmlns:a16="http://schemas.microsoft.com/office/drawing/2014/main" id="{BCF6BFCD-257A-40B2-ACF5-D9FBD751C7DB}"/>
+                <a16:creationId xmlns:a16="http://schemas.microsoft.com/office/drawing/2014/main" id="{DD7F1410-A8AF-4F3C-87A4-EDFC2EB7FC68}"/>
               </a:ext>
             </a:extLst>
           </p:cNvPr>
@@ -7223,47 +7984,56 @@
             <p:ph type="title"/>
           </p:nvPr>
         </p:nvSpPr>
-        <p:spPr/>
+        <p:spPr>
+          <a:xfrm>
+            <a:off x="167425" y="5177307"/>
+            <a:ext cx="9051187" cy="1519707"/>
+          </a:xfrm>
+        </p:spPr>
         <p:txBody>
           <a:bodyPr/>
           <a:lstStyle/>
           <a:p>
             <a:r>
               <a:rPr lang="en-US" dirty="0"/>
-              <a:t>Heatmap of variables (if I can get it working)</a:t>
-            </a:r>
-          </a:p>
-        </p:txBody>
-      </p:sp>
-      <p:sp>
-        <p:nvSpPr>
-          <p:cNvPr id="3" name="Content Placeholder 2">
+              <a:t>State Retail and recreation mobility</a:t>
+            </a:r>
+          </a:p>
+        </p:txBody>
+      </p:sp>
+      <p:pic>
+        <p:nvPicPr>
+          <p:cNvPr id="5" name="Content Placeholder 4" descr="Chart, line chart&#10;&#10;Description automatically generated">
             <a:extLst>
               <a:ext uri="{FF2B5EF4-FFF2-40B4-BE49-F238E27FC236}">
-                <a16:creationId xmlns:a16="http://schemas.microsoft.com/office/drawing/2014/main" id="{AF2A7004-B938-4B21-8115-3C7E69E675ED}"/>
+                <a16:creationId xmlns:a16="http://schemas.microsoft.com/office/drawing/2014/main" id="{FEC95E30-1BEA-443E-83A9-7FE2BD1BAB54}"/>
               </a:ext>
             </a:extLst>
           </p:cNvPr>
-          <p:cNvSpPr>
-            <a:spLocks noGrp="1"/>
-          </p:cNvSpPr>
+          <p:cNvPicPr>
+            <a:picLocks noGrp="1" noChangeAspect="1"/>
+          </p:cNvPicPr>
           <p:nvPr>
             <p:ph idx="1"/>
           </p:nvPr>
-        </p:nvSpPr>
-        <p:spPr/>
-        <p:txBody>
-          <a:bodyPr/>
-          <a:lstStyle/>
-          <a:p>
-            <a:endParaRPr lang="en-US"/>
-          </a:p>
-        </p:txBody>
-      </p:sp>
+        </p:nvPicPr>
+        <p:blipFill>
+          <a:blip r:embed="rId2"/>
+          <a:stretch>
+            <a:fillRect/>
+          </a:stretch>
+        </p:blipFill>
+        <p:spPr>
+          <a:xfrm>
+            <a:off x="750715" y="160986"/>
+            <a:ext cx="10690570" cy="5212080"/>
+          </a:xfrm>
+        </p:spPr>
+      </p:pic>
     </p:spTree>
     <p:extLst>
       <p:ext uri="{BB962C8B-B14F-4D97-AF65-F5344CB8AC3E}">
-        <p14:creationId xmlns:p14="http://schemas.microsoft.com/office/powerpoint/2010/main" val="2087543059"/>
+        <p14:creationId xmlns:p14="http://schemas.microsoft.com/office/powerpoint/2010/main" val="3078164528"/>
       </p:ext>
     </p:extLst>
   </p:cSld>
@@ -7548,15 +8318,6 @@
 </file>
 
 <file path=customXml/item1.xml><?xml version="1.0" encoding="utf-8"?>
-<p:properties xmlns:p="http://schemas.microsoft.com/office/2006/metadata/properties" xmlns:xsi="http://www.w3.org/2001/XMLSchema-instance" xmlns:pc="http://schemas.microsoft.com/office/infopath/2007/PartnerControls">
-  <documentManagement>
-    <Status xmlns="71af3243-3dd4-4a8d-8c0d-dd76da1f02a5">Not started</Status>
-    <MediaServiceKeyPoints xmlns="71af3243-3dd4-4a8d-8c0d-dd76da1f02a5" xsi:nil="true"/>
-  </documentManagement>
-</p:properties>
-</file>
-
-<file path=customXml/item2.xml><?xml version="1.0" encoding="utf-8"?>
 <?mso-contentType ?>
 <FormTemplates xmlns="http://schemas.microsoft.com/sharepoint/v3/contenttype/forms">
   <Display>DocumentLibraryForm</Display>
@@ -7565,7 +8326,7 @@
 </FormTemplates>
 </file>
 
-<file path=customXml/item3.xml><?xml version="1.0" encoding="utf-8"?>
+<file path=customXml/item2.xml><?xml version="1.0" encoding="utf-8"?>
 <ct:contentTypeSchema xmlns:ct="http://schemas.microsoft.com/office/2006/metadata/contentType" xmlns:ma="http://schemas.microsoft.com/office/2006/metadata/properties/metaAttributes" ct:_="" ma:_="" ma:contentTypeName="Document" ma:contentTypeID="0x01010079F111ED35F8CC479449609E8A0923A6" ma:contentTypeVersion="12" ma:contentTypeDescription="Create a new document." ma:contentTypeScope="" ma:versionID="a410dd7f93c95333ffa1b60ed6adedd1">
   <xsd:schema xmlns:xsd="http://www.w3.org/2001/XMLSchema" xmlns:xs="http://www.w3.org/2001/XMLSchema" xmlns:p="http://schemas.microsoft.com/office/2006/metadata/properties" xmlns:ns2="71af3243-3dd4-4a8d-8c0d-dd76da1f02a5" xmlns:ns3="16c05727-aa75-4e4a-9b5f-8a80a1165891" targetNamespace="http://schemas.microsoft.com/office/2006/metadata/properties" ma:root="true" ma:fieldsID="a936d9baba76aa3866493feff160faab" ns2:_="" ns3:_="">
     <xsd:import namespace="71af3243-3dd4-4a8d-8c0d-dd76da1f02a5"/>
@@ -7786,17 +8547,16 @@
 </ct:contentTypeSchema>
 </file>
 
-<file path=customXml/itemProps1.xml><?xml version="1.0" encoding="utf-8"?>
-<ds:datastoreItem xmlns:ds="http://schemas.openxmlformats.org/officeDocument/2006/customXml" ds:itemID="{A03EEFF0-FB57-4CB4-8BFC-DF397689E2ED}">
-  <ds:schemaRefs>
-    <ds:schemaRef ds:uri="http://schemas.microsoft.com/office/2006/metadata/properties"/>
-    <ds:schemaRef ds:uri="http://schemas.microsoft.com/office/infopath/2007/PartnerControls"/>
-    <ds:schemaRef ds:uri="71af3243-3dd4-4a8d-8c0d-dd76da1f02a5"/>
-  </ds:schemaRefs>
-</ds:datastoreItem>
+<file path=customXml/item3.xml><?xml version="1.0" encoding="utf-8"?>
+<p:properties xmlns:p="http://schemas.microsoft.com/office/2006/metadata/properties" xmlns:xsi="http://www.w3.org/2001/XMLSchema-instance" xmlns:pc="http://schemas.microsoft.com/office/infopath/2007/PartnerControls">
+  <documentManagement>
+    <Status xmlns="71af3243-3dd4-4a8d-8c0d-dd76da1f02a5">Not started</Status>
+    <MediaServiceKeyPoints xmlns="71af3243-3dd4-4a8d-8c0d-dd76da1f02a5" xsi:nil="true"/>
+  </documentManagement>
+</p:properties>
 </file>
 
-<file path=customXml/itemProps2.xml><?xml version="1.0" encoding="utf-8"?>
+<file path=customXml/itemProps1.xml><?xml version="1.0" encoding="utf-8"?>
 <ds:datastoreItem xmlns:ds="http://schemas.openxmlformats.org/officeDocument/2006/customXml" ds:itemID="{AA3F7EDC-E5B4-4BBC-9D2A-CBE6D46C37AD}">
   <ds:schemaRefs>
     <ds:schemaRef ds:uri="http://schemas.microsoft.com/sharepoint/v3/contenttype/forms"/>
@@ -7804,7 +8564,7 @@
 </ds:datastoreItem>
 </file>
 
-<file path=customXml/itemProps3.xml><?xml version="1.0" encoding="utf-8"?>
+<file path=customXml/itemProps2.xml><?xml version="1.0" encoding="utf-8"?>
 <ds:datastoreItem xmlns:ds="http://schemas.openxmlformats.org/officeDocument/2006/customXml" ds:itemID="{93932EF5-314F-409E-8020-FEE5FA0795B9}">
   <ds:schemaRefs>
     <ds:schemaRef ds:uri="http://schemas.microsoft.com/office/2006/metadata/contentType"/>
@@ -7821,4 +8581,14 @@
     <ds:schemaRef ds:uri="http://schemas.microsoft.com/internal/obd"/>
   </ds:schemaRefs>
 </ds:datastoreItem>
+</file>
+
+<file path=customXml/itemProps3.xml><?xml version="1.0" encoding="utf-8"?>
+<ds:datastoreItem xmlns:ds="http://schemas.openxmlformats.org/officeDocument/2006/customXml" ds:itemID="{A03EEFF0-FB57-4CB4-8BFC-DF397689E2ED}">
+  <ds:schemaRefs>
+    <ds:schemaRef ds:uri="http://schemas.microsoft.com/office/2006/metadata/properties"/>
+    <ds:schemaRef ds:uri="http://schemas.microsoft.com/office/infopath/2007/PartnerControls"/>
+    <ds:schemaRef ds:uri="71af3243-3dd4-4a8d-8c0d-dd76da1f02a5"/>
+  </ds:schemaRefs>
+</ds:datastoreItem>
 </file>
</xml_diff>